<commit_message>
Estudos de Power BI
</commit_message>
<xml_diff>
--- a/powerBi/Dashboard Financeiro/2/Background Editável - Dashboard.pptx
+++ b/powerBi/Dashboard Financeiro/2/Background Editável - Dashboard.pptx
@@ -116,13 +116,101 @@
 <file path=ppt/revisionInfo.xml><?xml version="1.0" encoding="utf-8"?>
 <p1510:revInfo xmlns:a="http://schemas.openxmlformats.org/drawingml/2006/main" xmlns:r="http://schemas.openxmlformats.org/officeDocument/2006/relationships" xmlns:p1510="http://schemas.microsoft.com/office/powerpoint/2015/10/main">
   <p1510:revLst>
-    <p1510:client id="{A901BB92-8D5B-4B7D-BF0C-E275EB980776}" v="307" dt="2022-03-10T20:26:50.420"/>
+    <p1510:client id="{4C6C57B1-905D-4DF1-BC9F-14D39E54E488}" v="1" dt="2022-04-26T19:04:18.449"/>
   </p1510:revLst>
 </p1510:revInfo>
 </file>
 
 <file path=ppt/changesInfos/changesInfo1.xml><?xml version="1.0" encoding="utf-8"?>
 <pc:chgInfo xmlns:a="http://schemas.openxmlformats.org/drawingml/2006/main" xmlns:r="http://schemas.openxmlformats.org/officeDocument/2006/relationships" xmlns:ac="http://schemas.microsoft.com/office/drawing/2013/main/command" xmlns:pc="http://schemas.microsoft.com/office/powerpoint/2013/main/command">
+  <pc:docChgLst>
+    <pc:chgData name="RAFAEL LUIS PARREIRA BOMFIM" userId="1cc5534e-0dc6-48f9-9dd3-2f2a13799de0" providerId="ADAL" clId="{4C6C57B1-905D-4DF1-BC9F-14D39E54E488}"/>
+    <pc:docChg chg="undo custSel modSld">
+      <pc:chgData name="RAFAEL LUIS PARREIRA BOMFIM" userId="1cc5534e-0dc6-48f9-9dd3-2f2a13799de0" providerId="ADAL" clId="{4C6C57B1-905D-4DF1-BC9F-14D39E54E488}" dt="2022-04-26T19:12:38.047" v="18" actId="1076"/>
+      <pc:docMkLst>
+        <pc:docMk/>
+      </pc:docMkLst>
+      <pc:sldChg chg="addSp delSp modSp mod">
+        <pc:chgData name="RAFAEL LUIS PARREIRA BOMFIM" userId="1cc5534e-0dc6-48f9-9dd3-2f2a13799de0" providerId="ADAL" clId="{4C6C57B1-905D-4DF1-BC9F-14D39E54E488}" dt="2022-04-26T19:12:38.047" v="18" actId="1076"/>
+        <pc:sldMkLst>
+          <pc:docMk/>
+          <pc:sldMk cId="238143731" sldId="260"/>
+        </pc:sldMkLst>
+        <pc:spChg chg="mod">
+          <ac:chgData name="RAFAEL LUIS PARREIRA BOMFIM" userId="1cc5534e-0dc6-48f9-9dd3-2f2a13799de0" providerId="ADAL" clId="{4C6C57B1-905D-4DF1-BC9F-14D39E54E488}" dt="2022-04-26T19:12:38.047" v="18" actId="1076"/>
+          <ac:spMkLst>
+            <pc:docMk/>
+            <pc:sldMk cId="238143731" sldId="260"/>
+            <ac:spMk id="10" creationId="{52B721FD-1032-42E6-8CDB-C7AD13EB59FB}"/>
+          </ac:spMkLst>
+        </pc:spChg>
+        <pc:spChg chg="add del">
+          <ac:chgData name="RAFAEL LUIS PARREIRA BOMFIM" userId="1cc5534e-0dc6-48f9-9dd3-2f2a13799de0" providerId="ADAL" clId="{4C6C57B1-905D-4DF1-BC9F-14D39E54E488}" dt="2022-04-26T19:05:04.505" v="10" actId="21"/>
+          <ac:spMkLst>
+            <pc:docMk/>
+            <pc:sldMk cId="238143731" sldId="260"/>
+            <ac:spMk id="35" creationId="{DCBBD22F-3DB8-4146-9F1A-13564B72B73D}"/>
+          </ac:spMkLst>
+        </pc:spChg>
+        <pc:spChg chg="mod">
+          <ac:chgData name="RAFAEL LUIS PARREIRA BOMFIM" userId="1cc5534e-0dc6-48f9-9dd3-2f2a13799de0" providerId="ADAL" clId="{4C6C57B1-905D-4DF1-BC9F-14D39E54E488}" dt="2022-04-26T19:12:37.671" v="17" actId="1076"/>
+          <ac:spMkLst>
+            <pc:docMk/>
+            <pc:sldMk cId="238143731" sldId="260"/>
+            <ac:spMk id="40" creationId="{F984AFBE-470C-4658-9610-2246AC12644E}"/>
+          </ac:spMkLst>
+        </pc:spChg>
+        <pc:spChg chg="mod">
+          <ac:chgData name="RAFAEL LUIS PARREIRA BOMFIM" userId="1cc5534e-0dc6-48f9-9dd3-2f2a13799de0" providerId="ADAL" clId="{4C6C57B1-905D-4DF1-BC9F-14D39E54E488}" dt="2022-04-26T18:57:51.175" v="5" actId="1076"/>
+          <ac:spMkLst>
+            <pc:docMk/>
+            <pc:sldMk cId="238143731" sldId="260"/>
+            <ac:spMk id="64" creationId="{8ECB8193-1CE3-45BD-A1C1-211EC078FC30}"/>
+          </ac:spMkLst>
+        </pc:spChg>
+        <pc:spChg chg="add del mod">
+          <ac:chgData name="RAFAEL LUIS PARREIRA BOMFIM" userId="1cc5534e-0dc6-48f9-9dd3-2f2a13799de0" providerId="ADAL" clId="{4C6C57B1-905D-4DF1-BC9F-14D39E54E488}" dt="2022-04-26T19:04:24.505" v="8" actId="478"/>
+          <ac:spMkLst>
+            <pc:docMk/>
+            <pc:sldMk cId="238143731" sldId="260"/>
+            <ac:spMk id="72" creationId="{49C4AD3D-29C5-460F-A0F2-6602C2E49CD1}"/>
+          </ac:spMkLst>
+        </pc:spChg>
+        <pc:spChg chg="mod">
+          <ac:chgData name="RAFAEL LUIS PARREIRA BOMFIM" userId="1cc5534e-0dc6-48f9-9dd3-2f2a13799de0" providerId="ADAL" clId="{4C6C57B1-905D-4DF1-BC9F-14D39E54E488}" dt="2022-04-26T18:51:50.519" v="1" actId="1076"/>
+          <ac:spMkLst>
+            <pc:docMk/>
+            <pc:sldMk cId="238143731" sldId="260"/>
+            <ac:spMk id="123" creationId="{08CB7143-44DB-4403-BBB7-16B4876B7386}"/>
+          </ac:spMkLst>
+        </pc:spChg>
+        <pc:grpChg chg="mod">
+          <ac:chgData name="RAFAEL LUIS PARREIRA BOMFIM" userId="1cc5534e-0dc6-48f9-9dd3-2f2a13799de0" providerId="ADAL" clId="{4C6C57B1-905D-4DF1-BC9F-14D39E54E488}" dt="2022-04-26T19:12:37.294" v="16" actId="1076"/>
+          <ac:grpSpMkLst>
+            <pc:docMk/>
+            <pc:sldMk cId="238143731" sldId="260"/>
+            <ac:grpSpMk id="27" creationId="{97C5718A-0940-4333-929C-BF4FA5739C61}"/>
+          </ac:grpSpMkLst>
+        </pc:grpChg>
+        <pc:grpChg chg="mod">
+          <ac:chgData name="RAFAEL LUIS PARREIRA BOMFIM" userId="1cc5534e-0dc6-48f9-9dd3-2f2a13799de0" providerId="ADAL" clId="{4C6C57B1-905D-4DF1-BC9F-14D39E54E488}" dt="2022-04-26T18:52:02.247" v="3" actId="1076"/>
+          <ac:grpSpMkLst>
+            <pc:docMk/>
+            <pc:sldMk cId="238143731" sldId="260"/>
+            <ac:grpSpMk id="49" creationId="{322E98E4-D9B6-43AC-8CC4-04BBA9DCEAC4}"/>
+          </ac:grpSpMkLst>
+        </pc:grpChg>
+        <pc:picChg chg="add del">
+          <ac:chgData name="RAFAEL LUIS PARREIRA BOMFIM" userId="1cc5534e-0dc6-48f9-9dd3-2f2a13799de0" providerId="ADAL" clId="{4C6C57B1-905D-4DF1-BC9F-14D39E54E488}" dt="2022-04-26T19:07:47.663" v="12" actId="478"/>
+          <ac:picMkLst>
+            <pc:docMk/>
+            <pc:sldMk cId="238143731" sldId="260"/>
+            <ac:picMk id="127" creationId="{39B5C46D-B5D7-4513-8BFA-0012A4A99EB3}"/>
+          </ac:picMkLst>
+        </pc:picChg>
+      </pc:sldChg>
+    </pc:docChg>
+  </pc:docChgLst>
   <pc:docChgLst>
     <pc:chgData name="Leticia Smirelli" userId="0e1bcaabcbd2bfa6" providerId="LiveId" clId="{A901BB92-8D5B-4B7D-BF0C-E275EB980776}"/>
     <pc:docChg chg="undo custSel addSld delSld modSld sldOrd">
@@ -2193,7 +2281,7 @@
           <a:p>
             <a:fld id="{4DDF5787-1C49-4DDE-A022-802682094CBD}" type="datetimeFigureOut">
               <a:rPr lang="pt-BR" smtClean="0"/>
-              <a:t>10/03/2022</a:t>
+              <a:t>26/04/2022</a:t>
             </a:fld>
             <a:endParaRPr lang="pt-BR"/>
           </a:p>
@@ -2391,7 +2479,7 @@
           <a:p>
             <a:fld id="{4DDF5787-1C49-4DDE-A022-802682094CBD}" type="datetimeFigureOut">
               <a:rPr lang="pt-BR" smtClean="0"/>
-              <a:t>10/03/2022</a:t>
+              <a:t>26/04/2022</a:t>
             </a:fld>
             <a:endParaRPr lang="pt-BR"/>
           </a:p>
@@ -2599,7 +2687,7 @@
           <a:p>
             <a:fld id="{4DDF5787-1C49-4DDE-A022-802682094CBD}" type="datetimeFigureOut">
               <a:rPr lang="pt-BR" smtClean="0"/>
-              <a:t>10/03/2022</a:t>
+              <a:t>26/04/2022</a:t>
             </a:fld>
             <a:endParaRPr lang="pt-BR"/>
           </a:p>
@@ -2797,7 +2885,7 @@
           <a:p>
             <a:fld id="{4DDF5787-1C49-4DDE-A022-802682094CBD}" type="datetimeFigureOut">
               <a:rPr lang="pt-BR" smtClean="0"/>
-              <a:t>10/03/2022</a:t>
+              <a:t>26/04/2022</a:t>
             </a:fld>
             <a:endParaRPr lang="pt-BR"/>
           </a:p>
@@ -3072,7 +3160,7 @@
           <a:p>
             <a:fld id="{4DDF5787-1C49-4DDE-A022-802682094CBD}" type="datetimeFigureOut">
               <a:rPr lang="pt-BR" smtClean="0"/>
-              <a:t>10/03/2022</a:t>
+              <a:t>26/04/2022</a:t>
             </a:fld>
             <a:endParaRPr lang="pt-BR"/>
           </a:p>
@@ -3337,7 +3425,7 @@
           <a:p>
             <a:fld id="{4DDF5787-1C49-4DDE-A022-802682094CBD}" type="datetimeFigureOut">
               <a:rPr lang="pt-BR" smtClean="0"/>
-              <a:t>10/03/2022</a:t>
+              <a:t>26/04/2022</a:t>
             </a:fld>
             <a:endParaRPr lang="pt-BR"/>
           </a:p>
@@ -3749,7 +3837,7 @@
           <a:p>
             <a:fld id="{4DDF5787-1C49-4DDE-A022-802682094CBD}" type="datetimeFigureOut">
               <a:rPr lang="pt-BR" smtClean="0"/>
-              <a:t>10/03/2022</a:t>
+              <a:t>26/04/2022</a:t>
             </a:fld>
             <a:endParaRPr lang="pt-BR"/>
           </a:p>
@@ -3890,7 +3978,7 @@
           <a:p>
             <a:fld id="{4DDF5787-1C49-4DDE-A022-802682094CBD}" type="datetimeFigureOut">
               <a:rPr lang="pt-BR" smtClean="0"/>
-              <a:t>10/03/2022</a:t>
+              <a:t>26/04/2022</a:t>
             </a:fld>
             <a:endParaRPr lang="pt-BR"/>
           </a:p>
@@ -4003,7 +4091,7 @@
           <a:p>
             <a:fld id="{4DDF5787-1C49-4DDE-A022-802682094CBD}" type="datetimeFigureOut">
               <a:rPr lang="pt-BR" smtClean="0"/>
-              <a:t>10/03/2022</a:t>
+              <a:t>26/04/2022</a:t>
             </a:fld>
             <a:endParaRPr lang="pt-BR"/>
           </a:p>
@@ -4314,7 +4402,7 @@
           <a:p>
             <a:fld id="{4DDF5787-1C49-4DDE-A022-802682094CBD}" type="datetimeFigureOut">
               <a:rPr lang="pt-BR" smtClean="0"/>
-              <a:t>10/03/2022</a:t>
+              <a:t>26/04/2022</a:t>
             </a:fld>
             <a:endParaRPr lang="pt-BR"/>
           </a:p>
@@ -4602,7 +4690,7 @@
           <a:p>
             <a:fld id="{4DDF5787-1C49-4DDE-A022-802682094CBD}" type="datetimeFigureOut">
               <a:rPr lang="pt-BR" smtClean="0"/>
-              <a:t>10/03/2022</a:t>
+              <a:t>26/04/2022</a:t>
             </a:fld>
             <a:endParaRPr lang="pt-BR"/>
           </a:p>
@@ -4843,7 +4931,7 @@
           <a:p>
             <a:fld id="{4DDF5787-1C49-4DDE-A022-802682094CBD}" type="datetimeFigureOut">
               <a:rPr lang="pt-BR" smtClean="0"/>
-              <a:t>10/03/2022</a:t>
+              <a:t>26/04/2022</a:t>
             </a:fld>
             <a:endParaRPr lang="pt-BR"/>
           </a:p>
@@ -5615,7 +5703,7 @@
               <a:defRPr/>
             </a:pPr>
             <a:r>
-              <a:rPr kumimoji="0" lang="pt-BR" sz="3600" b="0" i="0" u="none" strike="noStrike" kern="1200" cap="none" spc="20" normalizeH="0" noProof="0">
+              <a:rPr kumimoji="0" lang="pt-BR" sz="3600" b="0" i="0" u="none" strike="noStrike" kern="1200" cap="none" spc="20" normalizeH="0" noProof="0" dirty="0">
                 <a:ln>
                   <a:noFill/>
                 </a:ln>
@@ -5692,7 +5780,7 @@
               <a:defRPr/>
             </a:pPr>
             <a:r>
-              <a:rPr kumimoji="0" lang="pt-BR" sz="1800" b="0" i="0" u="none" strike="noStrike" kern="1200" cap="none" spc="20" normalizeH="0" noProof="0">
+              <a:rPr kumimoji="0" lang="pt-BR" sz="1800" b="0" i="0" u="none" strike="noStrike" kern="1200" cap="none" spc="20" normalizeH="0" noProof="0" dirty="0">
                 <a:ln>
                   <a:noFill/>
                 </a:ln>
@@ -7799,7 +7887,7 @@
               <a:defRPr/>
             </a:pPr>
             <a:r>
-              <a:rPr kumimoji="0" lang="pt-BR" sz="1000" b="0" i="0" u="none" strike="noStrike" kern="1200" cap="none" spc="20" normalizeH="0" noProof="0">
+              <a:rPr kumimoji="0" lang="pt-BR" sz="1000" b="0" i="0" u="none" strike="noStrike" kern="1200" cap="none" spc="20" normalizeH="0" noProof="0" dirty="0">
                 <a:ln>
                   <a:noFill/>
                 </a:ln>
@@ -7817,22 +7905,6 @@
               </a:rPr>
               <a:t>Dashboard Financeiro – Análise de Fluxo de Caixa</a:t>
             </a:r>
-            <a:endParaRPr kumimoji="0" lang="pt-BR" sz="1000" b="0" i="0" u="none" strike="noStrike" kern="1200" cap="none" spc="20" normalizeH="0" noProof="0" dirty="0">
-              <a:ln>
-                <a:noFill/>
-              </a:ln>
-              <a:solidFill>
-                <a:schemeClr val="bg2">
-                  <a:lumMod val="50000"/>
-                </a:schemeClr>
-              </a:solidFill>
-              <a:effectLst/>
-              <a:uLnTx/>
-              <a:uFillTx/>
-              <a:latin typeface="Poppins SemiBold" panose="00000700000000000000" pitchFamily="2" charset="0"/>
-              <a:ea typeface="Roboto" panose="02000000000000000000" pitchFamily="2" charset="0"/>
-              <a:cs typeface="Poppins SemiBold" panose="00000700000000000000" pitchFamily="2" charset="0"/>
-            </a:endParaRPr>
           </a:p>
         </p:txBody>
       </p:sp>
@@ -7897,7 +7969,7 @@
           </a:lstStyle>
           <a:p>
             <a:r>
-              <a:rPr lang="pt-BR" sz="1000" b="0">
+              <a:rPr lang="pt-BR" sz="1000" b="0" dirty="0">
                 <a:latin typeface="Poppins SemiBold" panose="00000700000000000000" pitchFamily="2" charset="0"/>
                 <a:cs typeface="Poppins SemiBold" panose="00000700000000000000" pitchFamily="2" charset="0"/>
               </a:rPr>
@@ -8153,7 +8225,7 @@
           </a:lstStyle>
           <a:p>
             <a:r>
-              <a:rPr lang="pt-BR" sz="900" b="0">
+              <a:rPr lang="pt-BR" sz="900" b="0" dirty="0">
                 <a:solidFill>
                   <a:schemeClr val="tx1"/>
                 </a:solidFill>
@@ -9842,7 +9914,7 @@
                   <a:defRPr/>
                 </a:pPr>
                 <a:r>
-                  <a:rPr lang="pt-BR" sz="1000" b="0" spc="20">
+                  <a:rPr lang="pt-BR" sz="1000" b="0" spc="20" dirty="0">
                     <a:solidFill>
                       <a:schemeClr val="bg2">
                         <a:lumMod val="50000"/>
@@ -10753,7 +10825,7 @@
                 <a:defRPr/>
               </a:pPr>
               <a:r>
-                <a:rPr lang="pt-BR" sz="1000" b="0" spc="20">
+                <a:rPr lang="pt-BR" sz="1000" b="0" spc="20" dirty="0">
                   <a:solidFill>
                     <a:schemeClr val="bg2">
                       <a:lumMod val="50000"/>

</xml_diff>